<commit_message>
final updates for the week
</commit_message>
<xml_diff>
--- a/pres-source/03-cloud-computing-background.pptx
+++ b/pres-source/03-cloud-computing-background.pptx
@@ -238,7 +238,7 @@
             <a:fld id="{7307762F-A706-E543-A832-3C298AA3103F}" type="datetimeFigureOut">
               <a:rPr lang="en-US" smtClean="0"/>
               <a:pPr/>
-              <a:t>13/11/15</a:t>
+              <a:t>27/11/15</a:t>
             </a:fld>
             <a:endParaRPr lang="en-US" dirty="0"/>
           </a:p>
@@ -1039,7 +1039,7 @@
           <a:p>
             <a:fld id="{875CF0EB-321F-0749-B37A-89BBA859503C}" type="datetimeFigureOut">
               <a:rPr lang="en-US" smtClean="0"/>
-              <a:t>13/11/15</a:t>
+              <a:t>27/11/15</a:t>
             </a:fld>
             <a:endParaRPr lang="en-US"/>
           </a:p>
@@ -1243,7 +1243,7 @@
           <a:p>
             <a:fld id="{875CF0EB-321F-0749-B37A-89BBA859503C}" type="datetimeFigureOut">
               <a:rPr lang="en-US" smtClean="0"/>
-              <a:t>13/11/15</a:t>
+              <a:t>27/11/15</a:t>
             </a:fld>
             <a:endParaRPr lang="en-US"/>
           </a:p>
@@ -1437,7 +1437,7 @@
           <a:p>
             <a:fld id="{875CF0EB-321F-0749-B37A-89BBA859503C}" type="datetimeFigureOut">
               <a:rPr lang="en-US" smtClean="0"/>
-              <a:t>13/11/15</a:t>
+              <a:t>27/11/15</a:t>
             </a:fld>
             <a:endParaRPr lang="en-US"/>
           </a:p>
@@ -1707,7 +1707,7 @@
           <a:p>
             <a:fld id="{875CF0EB-321F-0749-B37A-89BBA859503C}" type="datetimeFigureOut">
               <a:rPr lang="en-US" smtClean="0"/>
-              <a:t>13/11/15</a:t>
+              <a:t>27/11/15</a:t>
             </a:fld>
             <a:endParaRPr lang="en-US"/>
           </a:p>
@@ -2019,7 +2019,7 @@
           <a:p>
             <a:fld id="{875CF0EB-321F-0749-B37A-89BBA859503C}" type="datetimeFigureOut">
               <a:rPr lang="en-US" smtClean="0"/>
-              <a:t>13/11/15</a:t>
+              <a:t>27/11/15</a:t>
             </a:fld>
             <a:endParaRPr lang="en-US"/>
           </a:p>
@@ -2465,7 +2465,7 @@
           <a:p>
             <a:fld id="{875CF0EB-321F-0749-B37A-89BBA859503C}" type="datetimeFigureOut">
               <a:rPr lang="en-US" smtClean="0"/>
-              <a:t>13/11/15</a:t>
+              <a:t>27/11/15</a:t>
             </a:fld>
             <a:endParaRPr lang="en-US"/>
           </a:p>
@@ -2607,7 +2607,7 @@
           <a:p>
             <a:fld id="{875CF0EB-321F-0749-B37A-89BBA859503C}" type="datetimeFigureOut">
               <a:rPr lang="en-US" smtClean="0"/>
-              <a:t>13/11/15</a:t>
+              <a:t>27/11/15</a:t>
             </a:fld>
             <a:endParaRPr lang="en-US"/>
           </a:p>
@@ -2726,7 +2726,7 @@
           <a:p>
             <a:fld id="{875CF0EB-321F-0749-B37A-89BBA859503C}" type="datetimeFigureOut">
               <a:rPr lang="en-US" smtClean="0"/>
-              <a:t>13/11/15</a:t>
+              <a:t>27/11/15</a:t>
             </a:fld>
             <a:endParaRPr lang="en-US"/>
           </a:p>
@@ -3027,7 +3027,7 @@
           <a:p>
             <a:fld id="{875CF0EB-321F-0749-B37A-89BBA859503C}" type="datetimeFigureOut">
               <a:rPr lang="en-US" smtClean="0"/>
-              <a:t>13/11/15</a:t>
+              <a:t>27/11/15</a:t>
             </a:fld>
             <a:endParaRPr lang="en-US"/>
           </a:p>
@@ -3304,7 +3304,7 @@
           <a:p>
             <a:fld id="{875CF0EB-321F-0749-B37A-89BBA859503C}" type="datetimeFigureOut">
               <a:rPr lang="en-US" smtClean="0"/>
-              <a:t>13/11/15</a:t>
+              <a:t>27/11/15</a:t>
             </a:fld>
             <a:endParaRPr lang="en-US"/>
           </a:p>

</xml_diff>